<commit_message>
update final presentation styling
</commit_message>
<xml_diff>
--- a/Doc/FinalPresentation/FinalPresentation.pptx
+++ b/Doc/FinalPresentation/FinalPresentation.pptx
@@ -110,7 +110,24 @@
       </a:defRPr>
     </a:lvl9pPr>
   </p:defaultTextStyle>
+  <p:extLst>
+    <p:ext uri="{EFAFB233-063F-42B5-8137-9DF3F51BA10A}">
+      <p15:sldGuideLst xmlns:p15="http://schemas.microsoft.com/office/powerpoint/2012/main"/>
+    </p:ext>
+  </p:extLst>
 </p:presentation>
+</file>
+
+<file path=ppt/commentAuthors.xml><?xml version="1.0" encoding="utf-8"?>
+<p:cmAuthorLst xmlns:a="http://schemas.openxmlformats.org/drawingml/2006/main" xmlns:r="http://schemas.openxmlformats.org/officeDocument/2006/relationships" xmlns:p="http://schemas.openxmlformats.org/presentationml/2006/main">
+  <p:cmAuthor id="1" name="Zack Ren" initials="ZR" lastIdx="1" clrIdx="0">
+    <p:extLst>
+      <p:ext uri="{19B8F6BF-5375-455C-9EA6-DF929625EA0E}">
+        <p15:presenceInfo xmlns:p15="http://schemas.microsoft.com/office/powerpoint/2012/main" userId="4023faba3ca18fb5" providerId="Windows Live"/>
+      </p:ext>
+    </p:extLst>
+  </p:cmAuthor>
+</p:cmAuthorLst>
 </file>
 
 <file path=ppt/slideLayouts/slideLayout1.xml><?xml version="1.0" encoding="utf-8"?>
@@ -262,7 +279,7 @@
           <a:p>
             <a:fld id="{318FCCB6-3301-4A49-BE67-DD821C730218}" type="datetimeFigureOut">
               <a:rPr lang="en-CA" smtClean="0"/>
-              <a:t>2021-04-06</a:t>
+              <a:t>06/04/2021</a:t>
             </a:fld>
             <a:endParaRPr lang="en-CA"/>
           </a:p>
@@ -462,7 +479,7 @@
           <a:p>
             <a:fld id="{318FCCB6-3301-4A49-BE67-DD821C730218}" type="datetimeFigureOut">
               <a:rPr lang="en-CA" smtClean="0"/>
-              <a:t>2021-04-06</a:t>
+              <a:t>06/04/2021</a:t>
             </a:fld>
             <a:endParaRPr lang="en-CA"/>
           </a:p>
@@ -672,7 +689,7 @@
           <a:p>
             <a:fld id="{318FCCB6-3301-4A49-BE67-DD821C730218}" type="datetimeFigureOut">
               <a:rPr lang="en-CA" smtClean="0"/>
-              <a:t>2021-04-06</a:t>
+              <a:t>06/04/2021</a:t>
             </a:fld>
             <a:endParaRPr lang="en-CA"/>
           </a:p>
@@ -872,7 +889,7 @@
           <a:p>
             <a:fld id="{318FCCB6-3301-4A49-BE67-DD821C730218}" type="datetimeFigureOut">
               <a:rPr lang="en-CA" smtClean="0"/>
-              <a:t>2021-04-06</a:t>
+              <a:t>06/04/2021</a:t>
             </a:fld>
             <a:endParaRPr lang="en-CA"/>
           </a:p>
@@ -1148,7 +1165,7 @@
           <a:p>
             <a:fld id="{318FCCB6-3301-4A49-BE67-DD821C730218}" type="datetimeFigureOut">
               <a:rPr lang="en-CA" smtClean="0"/>
-              <a:t>2021-04-06</a:t>
+              <a:t>06/04/2021</a:t>
             </a:fld>
             <a:endParaRPr lang="en-CA"/>
           </a:p>
@@ -1416,7 +1433,7 @@
           <a:p>
             <a:fld id="{318FCCB6-3301-4A49-BE67-DD821C730218}" type="datetimeFigureOut">
               <a:rPr lang="en-CA" smtClean="0"/>
-              <a:t>2021-04-06</a:t>
+              <a:t>06/04/2021</a:t>
             </a:fld>
             <a:endParaRPr lang="en-CA"/>
           </a:p>
@@ -1831,7 +1848,7 @@
           <a:p>
             <a:fld id="{318FCCB6-3301-4A49-BE67-DD821C730218}" type="datetimeFigureOut">
               <a:rPr lang="en-CA" smtClean="0"/>
-              <a:t>2021-04-06</a:t>
+              <a:t>06/04/2021</a:t>
             </a:fld>
             <a:endParaRPr lang="en-CA"/>
           </a:p>
@@ -1973,7 +1990,7 @@
           <a:p>
             <a:fld id="{318FCCB6-3301-4A49-BE67-DD821C730218}" type="datetimeFigureOut">
               <a:rPr lang="en-CA" smtClean="0"/>
-              <a:t>2021-04-06</a:t>
+              <a:t>06/04/2021</a:t>
             </a:fld>
             <a:endParaRPr lang="en-CA"/>
           </a:p>
@@ -2086,7 +2103,7 @@
           <a:p>
             <a:fld id="{318FCCB6-3301-4A49-BE67-DD821C730218}" type="datetimeFigureOut">
               <a:rPr lang="en-CA" smtClean="0"/>
-              <a:t>2021-04-06</a:t>
+              <a:t>06/04/2021</a:t>
             </a:fld>
             <a:endParaRPr lang="en-CA"/>
           </a:p>
@@ -2399,7 +2416,7 @@
           <a:p>
             <a:fld id="{318FCCB6-3301-4A49-BE67-DD821C730218}" type="datetimeFigureOut">
               <a:rPr lang="en-CA" smtClean="0"/>
-              <a:t>2021-04-06</a:t>
+              <a:t>06/04/2021</a:t>
             </a:fld>
             <a:endParaRPr lang="en-CA"/>
           </a:p>
@@ -2688,7 +2705,7 @@
           <a:p>
             <a:fld id="{318FCCB6-3301-4A49-BE67-DD821C730218}" type="datetimeFigureOut">
               <a:rPr lang="en-CA" smtClean="0"/>
-              <a:t>2021-04-06</a:t>
+              <a:t>06/04/2021</a:t>
             </a:fld>
             <a:endParaRPr lang="en-CA"/>
           </a:p>
@@ -2931,7 +2948,7 @@
           <a:p>
             <a:fld id="{318FCCB6-3301-4A49-BE67-DD821C730218}" type="datetimeFigureOut">
               <a:rPr lang="en-CA" smtClean="0"/>
-              <a:t>2021-04-06</a:t>
+              <a:t>06/04/2021</a:t>
             </a:fld>
             <a:endParaRPr lang="en-CA"/>
           </a:p>
@@ -3350,55 +3367,303 @@
       </p:grpSpPr>
       <p:sp>
         <p:nvSpPr>
-          <p:cNvPr id="2" name="Title 1">
-            <a:extLst>
-              <a:ext uri="{FF2B5EF4-FFF2-40B4-BE49-F238E27FC236}">
-                <a16:creationId xmlns:a16="http://schemas.microsoft.com/office/drawing/2014/main" id="{D2B677EF-D82C-4958-BC85-A3E3C7420EBE}"/>
-              </a:ext>
-            </a:extLst>
-          </p:cNvPr>
-          <p:cNvSpPr>
-            <a:spLocks noGrp="1"/>
-          </p:cNvSpPr>
-          <p:nvPr>
-            <p:ph type="ctrTitle"/>
+          <p:cNvPr id="3" name="Subtitle 2">
+            <a:extLst>
+              <a:ext uri="{FF2B5EF4-FFF2-40B4-BE49-F238E27FC236}">
+                <a16:creationId xmlns:a16="http://schemas.microsoft.com/office/drawing/2014/main" id="{60C86A3D-2606-443C-A849-2C1A85687A6F}"/>
+              </a:ext>
+            </a:extLst>
+          </p:cNvPr>
+          <p:cNvSpPr>
+            <a:spLocks noGrp="1"/>
+          </p:cNvSpPr>
+          <p:nvPr>
+            <p:ph type="subTitle" idx="1"/>
           </p:nvPr>
         </p:nvSpPr>
         <p:spPr/>
         <p:txBody>
-          <a:bodyPr/>
-          <a:lstStyle/>
-          <a:p>
-            <a:r>
-              <a:rPr lang="en-CA" dirty="0" err="1"/>
-              <a:t>Euneva</a:t>
-            </a:r>
+          <a:bodyPr>
+            <a:normAutofit lnSpcReduction="10000"/>
+          </a:bodyPr>
+          <a:lstStyle/>
+          <a:p>
+            <a:r>
+              <a:rPr lang="en-CA" dirty="0">
+                <a:latin typeface="Lato" panose="020F0502020204030203" pitchFamily="34" charset="0"/>
+                <a:ea typeface="Lato" panose="020F0502020204030203" pitchFamily="34" charset="0"/>
+                <a:cs typeface="Lato" panose="020F0502020204030203" pitchFamily="34" charset="0"/>
+              </a:rPr>
+              <a:t>Team 9</a:t>
+            </a:r>
+          </a:p>
+          <a:p>
+            <a:r>
+              <a:rPr lang="en-CA" dirty="0" err="1">
+                <a:latin typeface="Lato" panose="020F0502020204030203" pitchFamily="34" charset="0"/>
+                <a:ea typeface="Lato" panose="020F0502020204030203" pitchFamily="34" charset="0"/>
+                <a:cs typeface="Lato" panose="020F0502020204030203" pitchFamily="34" charset="0"/>
+              </a:rPr>
+              <a:t>Jash</a:t>
+            </a:r>
+            <a:r>
+              <a:rPr lang="en-CA" dirty="0">
+                <a:latin typeface="Lato" panose="020F0502020204030203" pitchFamily="34" charset="0"/>
+                <a:ea typeface="Lato" panose="020F0502020204030203" pitchFamily="34" charset="0"/>
+                <a:cs typeface="Lato" panose="020F0502020204030203" pitchFamily="34" charset="0"/>
+              </a:rPr>
+              <a:t> Mehta</a:t>
+            </a:r>
+          </a:p>
+          <a:p>
+            <a:r>
+              <a:rPr lang="en-CA" dirty="0">
+                <a:latin typeface="Lato" panose="020F0502020204030203" pitchFamily="34" charset="0"/>
+                <a:ea typeface="Lato" panose="020F0502020204030203" pitchFamily="34" charset="0"/>
+                <a:cs typeface="Lato" panose="020F0502020204030203" pitchFamily="34" charset="0"/>
+              </a:rPr>
+              <a:t>Aditya Sharma</a:t>
+            </a:r>
+          </a:p>
+          <a:p>
+            <a:r>
+              <a:rPr lang="en-CA" dirty="0">
+                <a:latin typeface="Lato" panose="020F0502020204030203" pitchFamily="34" charset="0"/>
+                <a:ea typeface="Lato" panose="020F0502020204030203" pitchFamily="34" charset="0"/>
+                <a:cs typeface="Lato" panose="020F0502020204030203" pitchFamily="34" charset="0"/>
+              </a:rPr>
+              <a:t>Zackary Ren</a:t>
+            </a:r>
+          </a:p>
+        </p:txBody>
+      </p:sp>
+      <p:sp>
+        <p:nvSpPr>
+          <p:cNvPr id="5" name="TextBox 4">
+            <a:extLst>
+              <a:ext uri="{FF2B5EF4-FFF2-40B4-BE49-F238E27FC236}">
+                <a16:creationId xmlns:a16="http://schemas.microsoft.com/office/drawing/2014/main" id="{DBB9750A-8922-4F6B-8793-C006A22B18DC}"/>
+              </a:ext>
+            </a:extLst>
+          </p:cNvPr>
+          <p:cNvSpPr txBox="1"/>
+          <p:nvPr/>
+        </p:nvSpPr>
+        <p:spPr>
+          <a:xfrm>
+            <a:off x="3048000" y="2125228"/>
+            <a:ext cx="6096000" cy="1754326"/>
+          </a:xfrm>
+          <a:prstGeom prst="rect">
+            <a:avLst/>
+          </a:prstGeom>
+          <a:noFill/>
+        </p:spPr>
+        <p:txBody>
+          <a:bodyPr wrap="square">
+            <a:spAutoFit/>
+          </a:bodyPr>
+          <a:lstStyle/>
+          <a:p>
+            <a:pPr algn="ctr" rtl="0">
+              <a:spcBef>
+                <a:spcPts val="0"/>
+              </a:spcBef>
+              <a:spcAft>
+                <a:spcPts val="0"/>
+              </a:spcAft>
+            </a:pPr>
+            <a:r>
+              <a:rPr lang="en-CA" sz="7200" b="1" i="0" u="none" strike="noStrike" dirty="0" err="1">
+                <a:solidFill>
+                  <a:srgbClr val="999999"/>
+                </a:solidFill>
+                <a:effectLst/>
+                <a:latin typeface="Lato" panose="020F0502020204030203" pitchFamily="34" charset="0"/>
+              </a:rPr>
+              <a:t>eunev</a:t>
+            </a:r>
+            <a:r>
+              <a:rPr lang="en-CA" sz="7200" b="1" i="0" u="none" strike="noStrike" dirty="0" err="1">
+                <a:solidFill>
+                  <a:srgbClr val="980404"/>
+                </a:solidFill>
+                <a:effectLst/>
+                <a:latin typeface="Lato" panose="020F0502020204030203" pitchFamily="34" charset="0"/>
+              </a:rPr>
+              <a:t>a</a:t>
+            </a:r>
+            <a:endParaRPr lang="en-CA" sz="7200" b="0" dirty="0">
+              <a:effectLst/>
+            </a:endParaRPr>
+          </a:p>
+          <a:p>
+            <a:br>
+              <a:rPr lang="en-CA" dirty="0"/>
+            </a:br>
             <a:endParaRPr lang="en-CA" dirty="0"/>
           </a:p>
         </p:txBody>
       </p:sp>
       <p:sp>
         <p:nvSpPr>
-          <p:cNvPr id="3" name="Subtitle 2">
-            <a:extLst>
-              <a:ext uri="{FF2B5EF4-FFF2-40B4-BE49-F238E27FC236}">
-                <a16:creationId xmlns:a16="http://schemas.microsoft.com/office/drawing/2014/main" id="{60C86A3D-2606-443C-A849-2C1A85687A6F}"/>
-              </a:ext>
-            </a:extLst>
-          </p:cNvPr>
-          <p:cNvSpPr>
-            <a:spLocks noGrp="1"/>
-          </p:cNvSpPr>
-          <p:nvPr>
-            <p:ph type="subTitle" idx="1"/>
-          </p:nvPr>
-        </p:nvSpPr>
-        <p:spPr/>
-        <p:txBody>
-          <a:bodyPr/>
-          <a:lstStyle/>
-          <a:p>
-            <a:endParaRPr lang="en-CA" dirty="0"/>
+          <p:cNvPr id="8" name="Oval 7">
+            <a:extLst>
+              <a:ext uri="{FF2B5EF4-FFF2-40B4-BE49-F238E27FC236}">
+                <a16:creationId xmlns:a16="http://schemas.microsoft.com/office/drawing/2014/main" id="{B57D13E8-984F-4387-BD5E-A375399EBC17}"/>
+              </a:ext>
+            </a:extLst>
+          </p:cNvPr>
+          <p:cNvSpPr/>
+          <p:nvPr/>
+        </p:nvSpPr>
+        <p:spPr>
+          <a:xfrm>
+            <a:off x="-922217" y="4289242"/>
+            <a:ext cx="2672861" cy="2672861"/>
+          </a:xfrm>
+          <a:prstGeom prst="ellipse">
+            <a:avLst/>
+          </a:prstGeom>
+          <a:solidFill>
+            <a:srgbClr val="980404"/>
+          </a:solidFill>
+          <a:ln>
+            <a:noFill/>
+          </a:ln>
+        </p:spPr>
+        <p:style>
+          <a:lnRef idx="2">
+            <a:schemeClr val="accent1">
+              <a:shade val="50000"/>
+            </a:schemeClr>
+          </a:lnRef>
+          <a:fillRef idx="1">
+            <a:schemeClr val="accent1"/>
+          </a:fillRef>
+          <a:effectRef idx="0">
+            <a:schemeClr val="accent1"/>
+          </a:effectRef>
+          <a:fontRef idx="minor">
+            <a:schemeClr val="lt1"/>
+          </a:fontRef>
+        </p:style>
+        <p:txBody>
+          <a:bodyPr rtlCol="0" anchor="ctr"/>
+          <a:lstStyle/>
+          <a:p>
+            <a:pPr algn="ctr"/>
+            <a:endParaRPr lang="en-CA"/>
+          </a:p>
+        </p:txBody>
+      </p:sp>
+      <p:sp>
+        <p:nvSpPr>
+          <p:cNvPr id="9" name="Oval 8">
+            <a:extLst>
+              <a:ext uri="{FF2B5EF4-FFF2-40B4-BE49-F238E27FC236}">
+                <a16:creationId xmlns:a16="http://schemas.microsoft.com/office/drawing/2014/main" id="{252AD124-EE56-41F5-9A25-8EF83B21BE04}"/>
+              </a:ext>
+            </a:extLst>
+          </p:cNvPr>
+          <p:cNvSpPr/>
+          <p:nvPr/>
+        </p:nvSpPr>
+        <p:spPr>
+          <a:xfrm>
+            <a:off x="0" y="5460702"/>
+            <a:ext cx="2672861" cy="2672861"/>
+          </a:xfrm>
+          <a:prstGeom prst="ellipse">
+            <a:avLst/>
+          </a:prstGeom>
+          <a:solidFill>
+            <a:srgbClr val="999999"/>
+          </a:solidFill>
+          <a:ln>
+            <a:noFill/>
+          </a:ln>
+        </p:spPr>
+        <p:style>
+          <a:lnRef idx="2">
+            <a:schemeClr val="accent1">
+              <a:shade val="50000"/>
+            </a:schemeClr>
+          </a:lnRef>
+          <a:fillRef idx="1">
+            <a:schemeClr val="accent1"/>
+          </a:fillRef>
+          <a:effectRef idx="0">
+            <a:schemeClr val="accent1"/>
+          </a:effectRef>
+          <a:fontRef idx="minor">
+            <a:schemeClr val="lt1"/>
+          </a:fontRef>
+        </p:style>
+        <p:txBody>
+          <a:bodyPr rtlCol="0" anchor="ctr"/>
+          <a:lstStyle/>
+          <a:p>
+            <a:pPr algn="ctr"/>
+            <a:endParaRPr lang="en-CA"/>
+          </a:p>
+        </p:txBody>
+      </p:sp>
+      <p:sp>
+        <p:nvSpPr>
+          <p:cNvPr id="10" name="Circle: Hollow 9">
+            <a:extLst>
+              <a:ext uri="{FF2B5EF4-FFF2-40B4-BE49-F238E27FC236}">
+                <a16:creationId xmlns:a16="http://schemas.microsoft.com/office/drawing/2014/main" id="{56A17B1A-C03F-4338-A66B-01B43415A061}"/>
+              </a:ext>
+            </a:extLst>
+          </p:cNvPr>
+          <p:cNvSpPr/>
+          <p:nvPr/>
+        </p:nvSpPr>
+        <p:spPr>
+          <a:xfrm>
+            <a:off x="10668000" y="-453293"/>
+            <a:ext cx="2672861" cy="2672861"/>
+          </a:xfrm>
+          <a:prstGeom prst="donut">
+            <a:avLst>
+              <a:gd name="adj" fmla="val 8004"/>
+            </a:avLst>
+          </a:prstGeom>
+          <a:solidFill>
+            <a:srgbClr val="980404"/>
+          </a:solidFill>
+          <a:ln>
+            <a:noFill/>
+          </a:ln>
+        </p:spPr>
+        <p:style>
+          <a:lnRef idx="2">
+            <a:schemeClr val="accent1">
+              <a:shade val="50000"/>
+            </a:schemeClr>
+          </a:lnRef>
+          <a:fillRef idx="1">
+            <a:schemeClr val="accent1"/>
+          </a:fillRef>
+          <a:effectRef idx="0">
+            <a:schemeClr val="accent1"/>
+          </a:effectRef>
+          <a:fontRef idx="minor">
+            <a:schemeClr val="lt1"/>
+          </a:fontRef>
+        </p:style>
+        <p:txBody>
+          <a:bodyPr rtlCol="0" anchor="ctr"/>
+          <a:lstStyle/>
+          <a:p>
+            <a:pPr algn="ctr"/>
+            <a:endParaRPr lang="en-CA">
+              <a:solidFill>
+                <a:schemeClr val="tx1"/>
+              </a:solidFill>
+            </a:endParaRPr>
           </a:p>
         </p:txBody>
       </p:sp>
@@ -3479,47 +3744,258 @@
           <a:lstStyle/>
           <a:p>
             <a:r>
-              <a:rPr lang="en-CA" dirty="0"/>
+              <a:rPr lang="en-CA" dirty="0">
+                <a:latin typeface="Lato" panose="020F0502020204030203" pitchFamily="34" charset="0"/>
+                <a:ea typeface="Lato" panose="020F0502020204030203" pitchFamily="34" charset="0"/>
+                <a:cs typeface="Lato" panose="020F0502020204030203" pitchFamily="34" charset="0"/>
+              </a:rPr>
               <a:t>Purpose</a:t>
             </a:r>
           </a:p>
           <a:p>
             <a:pPr lvl="1"/>
             <a:r>
-              <a:rPr lang="en-CA" dirty="0"/>
+              <a:rPr lang="en-CA" dirty="0">
+                <a:latin typeface="Lato" panose="020F0502020204030203" pitchFamily="34" charset="0"/>
+                <a:ea typeface="Lato" panose="020F0502020204030203" pitchFamily="34" charset="0"/>
+                <a:cs typeface="Lato" panose="020F0502020204030203" pitchFamily="34" charset="0"/>
+              </a:rPr>
               <a:t>We improved upon an existing web application for a To-Do list, adding an implementation to web scrape Avenue to Learn (A2L) for quizzes and assignment information for current courses and displaying it in a organized manner.</a:t>
             </a:r>
           </a:p>
           <a:p>
             <a:r>
-              <a:rPr lang="en-CA" dirty="0"/>
+              <a:rPr lang="en-CA" dirty="0">
+                <a:latin typeface="Lato" panose="020F0502020204030203" pitchFamily="34" charset="0"/>
+                <a:ea typeface="Lato" panose="020F0502020204030203" pitchFamily="34" charset="0"/>
+                <a:cs typeface="Lato" panose="020F0502020204030203" pitchFamily="34" charset="0"/>
+              </a:rPr>
               <a:t>Scope</a:t>
             </a:r>
           </a:p>
           <a:p>
             <a:pPr lvl="1"/>
             <a:r>
-              <a:rPr lang="en-CA" dirty="0"/>
+              <a:rPr lang="en-CA" dirty="0">
+                <a:latin typeface="Lato" panose="020F0502020204030203" pitchFamily="34" charset="0"/>
+                <a:ea typeface="Lato" panose="020F0502020204030203" pitchFamily="34" charset="0"/>
+                <a:cs typeface="Lato" panose="020F0502020204030203" pitchFamily="34" charset="0"/>
+              </a:rPr>
               <a:t>The backend web-scraping is done through python.</a:t>
             </a:r>
           </a:p>
           <a:p>
             <a:pPr lvl="1"/>
             <a:r>
-              <a:rPr lang="en-CA" dirty="0"/>
+              <a:rPr lang="en-CA" dirty="0">
+                <a:latin typeface="Lato" panose="020F0502020204030203" pitchFamily="34" charset="0"/>
+                <a:ea typeface="Lato" panose="020F0502020204030203" pitchFamily="34" charset="0"/>
+                <a:cs typeface="Lato" panose="020F0502020204030203" pitchFamily="34" charset="0"/>
+              </a:rPr>
               <a:t>The frontend web application is made with react-native.</a:t>
             </a:r>
           </a:p>
           <a:p>
             <a:pPr lvl="1"/>
-            <a:endParaRPr lang="en-CA" dirty="0"/>
+            <a:endParaRPr lang="en-CA" dirty="0">
+              <a:latin typeface="Lato" panose="020F0502020204030203" pitchFamily="34" charset="0"/>
+              <a:ea typeface="Lato" panose="020F0502020204030203" pitchFamily="34" charset="0"/>
+              <a:cs typeface="Lato" panose="020F0502020204030203" pitchFamily="34" charset="0"/>
+            </a:endParaRPr>
           </a:p>
           <a:p>
             <a:pPr lvl="1"/>
-            <a:endParaRPr lang="en-CA" dirty="0"/>
-          </a:p>
-        </p:txBody>
-      </p:sp>
+            <a:endParaRPr lang="en-CA" dirty="0">
+              <a:latin typeface="Lato" panose="020F0502020204030203" pitchFamily="34" charset="0"/>
+              <a:ea typeface="Lato" panose="020F0502020204030203" pitchFamily="34" charset="0"/>
+              <a:cs typeface="Lato" panose="020F0502020204030203" pitchFamily="34" charset="0"/>
+            </a:endParaRPr>
+          </a:p>
+        </p:txBody>
+      </p:sp>
+      <p:grpSp>
+        <p:nvGrpSpPr>
+          <p:cNvPr id="7" name="Group 6">
+            <a:extLst>
+              <a:ext uri="{FF2B5EF4-FFF2-40B4-BE49-F238E27FC236}">
+                <a16:creationId xmlns:a16="http://schemas.microsoft.com/office/drawing/2014/main" id="{E074E7E8-77B4-4423-98D9-1A32D39473B6}"/>
+              </a:ext>
+            </a:extLst>
+          </p:cNvPr>
+          <p:cNvGrpSpPr/>
+          <p:nvPr/>
+        </p:nvGrpSpPr>
+        <p:grpSpPr>
+          <a:xfrm>
+            <a:off x="8465820" y="4020893"/>
+            <a:ext cx="5775959" cy="4582014"/>
+            <a:chOff x="7299961" y="3758041"/>
+            <a:chExt cx="5775959" cy="4582014"/>
+          </a:xfrm>
+        </p:grpSpPr>
+        <p:sp>
+          <p:nvSpPr>
+            <p:cNvPr id="4" name="Parallelogram 3">
+              <a:extLst>
+                <a:ext uri="{FF2B5EF4-FFF2-40B4-BE49-F238E27FC236}">
+                  <a16:creationId xmlns:a16="http://schemas.microsoft.com/office/drawing/2014/main" id="{716B4A21-9C2F-40A3-A933-0533CAB1FBFA}"/>
+                </a:ext>
+              </a:extLst>
+            </p:cNvPr>
+            <p:cNvSpPr/>
+            <p:nvPr/>
+          </p:nvSpPr>
+          <p:spPr>
+            <a:xfrm rot="171982">
+              <a:off x="8183880" y="4520041"/>
+              <a:ext cx="4892040" cy="3820014"/>
+            </a:xfrm>
+            <a:prstGeom prst="parallelogram">
+              <a:avLst>
+                <a:gd name="adj" fmla="val 111572"/>
+              </a:avLst>
+            </a:prstGeom>
+            <a:solidFill>
+              <a:srgbClr val="980404"/>
+            </a:solidFill>
+            <a:ln>
+              <a:noFill/>
+            </a:ln>
+          </p:spPr>
+          <p:style>
+            <a:lnRef idx="2">
+              <a:schemeClr val="accent1">
+                <a:shade val="50000"/>
+              </a:schemeClr>
+            </a:lnRef>
+            <a:fillRef idx="1">
+              <a:schemeClr val="accent1"/>
+            </a:fillRef>
+            <a:effectRef idx="0">
+              <a:schemeClr val="accent1"/>
+            </a:effectRef>
+            <a:fontRef idx="minor">
+              <a:schemeClr val="lt1"/>
+            </a:fontRef>
+          </p:style>
+          <p:txBody>
+            <a:bodyPr rtlCol="0" anchor="ctr"/>
+            <a:lstStyle/>
+            <a:p>
+              <a:pPr algn="ctr"/>
+              <a:endParaRPr lang="en-CA" dirty="0"/>
+            </a:p>
+          </p:txBody>
+        </p:sp>
+        <p:sp>
+          <p:nvSpPr>
+            <p:cNvPr id="5" name="Parallelogram 4">
+              <a:extLst>
+                <a:ext uri="{FF2B5EF4-FFF2-40B4-BE49-F238E27FC236}">
+                  <a16:creationId xmlns:a16="http://schemas.microsoft.com/office/drawing/2014/main" id="{50137E53-0982-48FE-923E-4B7107BBACA0}"/>
+                </a:ext>
+              </a:extLst>
+            </p:cNvPr>
+            <p:cNvSpPr/>
+            <p:nvPr/>
+          </p:nvSpPr>
+          <p:spPr>
+            <a:xfrm rot="171982">
+              <a:off x="7741921" y="4139040"/>
+              <a:ext cx="4892040" cy="3820014"/>
+            </a:xfrm>
+            <a:prstGeom prst="parallelogram">
+              <a:avLst>
+                <a:gd name="adj" fmla="val 111572"/>
+              </a:avLst>
+            </a:prstGeom>
+            <a:solidFill>
+              <a:srgbClr val="999999"/>
+            </a:solidFill>
+            <a:ln>
+              <a:noFill/>
+            </a:ln>
+          </p:spPr>
+          <p:style>
+            <a:lnRef idx="2">
+              <a:schemeClr val="accent1">
+                <a:shade val="50000"/>
+              </a:schemeClr>
+            </a:lnRef>
+            <a:fillRef idx="1">
+              <a:schemeClr val="accent1"/>
+            </a:fillRef>
+            <a:effectRef idx="0">
+              <a:schemeClr val="accent1"/>
+            </a:effectRef>
+            <a:fontRef idx="minor">
+              <a:schemeClr val="lt1"/>
+            </a:fontRef>
+          </p:style>
+          <p:txBody>
+            <a:bodyPr rtlCol="0" anchor="ctr"/>
+            <a:lstStyle/>
+            <a:p>
+              <a:pPr algn="ctr"/>
+              <a:endParaRPr lang="en-CA" dirty="0"/>
+            </a:p>
+          </p:txBody>
+        </p:sp>
+        <p:sp>
+          <p:nvSpPr>
+            <p:cNvPr id="6" name="Parallelogram 5">
+              <a:extLst>
+                <a:ext uri="{FF2B5EF4-FFF2-40B4-BE49-F238E27FC236}">
+                  <a16:creationId xmlns:a16="http://schemas.microsoft.com/office/drawing/2014/main" id="{88888520-9823-4EBC-9A36-9200EC829FC7}"/>
+                </a:ext>
+              </a:extLst>
+            </p:cNvPr>
+            <p:cNvSpPr/>
+            <p:nvPr/>
+          </p:nvSpPr>
+          <p:spPr>
+            <a:xfrm rot="171982">
+              <a:off x="7299961" y="3758041"/>
+              <a:ext cx="4892040" cy="3820014"/>
+            </a:xfrm>
+            <a:prstGeom prst="parallelogram">
+              <a:avLst>
+                <a:gd name="adj" fmla="val 111572"/>
+              </a:avLst>
+            </a:prstGeom>
+            <a:solidFill>
+              <a:srgbClr val="980404"/>
+            </a:solidFill>
+            <a:ln>
+              <a:noFill/>
+            </a:ln>
+          </p:spPr>
+          <p:style>
+            <a:lnRef idx="2">
+              <a:schemeClr val="accent1">
+                <a:shade val="50000"/>
+              </a:schemeClr>
+            </a:lnRef>
+            <a:fillRef idx="1">
+              <a:schemeClr val="accent1"/>
+            </a:fillRef>
+            <a:effectRef idx="0">
+              <a:schemeClr val="accent1"/>
+            </a:effectRef>
+            <a:fontRef idx="minor">
+              <a:schemeClr val="lt1"/>
+            </a:fontRef>
+          </p:style>
+          <p:txBody>
+            <a:bodyPr rtlCol="0" anchor="ctr"/>
+            <a:lstStyle/>
+            <a:p>
+              <a:pPr algn="ctr"/>
+              <a:endParaRPr lang="en-CA" dirty="0"/>
+            </a:p>
+          </p:txBody>
+        </p:sp>
+      </p:grpSp>
     </p:spTree>
     <p:extLst>
       <p:ext uri="{BB962C8B-B14F-4D97-AF65-F5344CB8AC3E}">
@@ -3572,7 +4048,14 @@
           <a:lstStyle/>
           <a:p>
             <a:r>
-              <a:rPr lang="en-CA" dirty="0"/>
+              <a:rPr lang="en-CA" dirty="0">
+                <a:solidFill>
+                  <a:srgbClr val="980404"/>
+                </a:solidFill>
+                <a:latin typeface="Lora" panose="00000500000000000000" pitchFamily="2" charset="0"/>
+                <a:ea typeface="Lato" panose="020F0502020204030203" pitchFamily="34" charset="0"/>
+                <a:cs typeface="Lato" panose="020F0502020204030203" pitchFamily="34" charset="0"/>
+              </a:rPr>
               <a:t>Background</a:t>
             </a:r>
           </a:p>
@@ -3594,39 +4077,220 @@
             <p:ph idx="1"/>
           </p:nvPr>
         </p:nvSpPr>
-        <p:spPr/>
+        <p:spPr>
+          <a:xfrm>
+            <a:off x="838200" y="1863351"/>
+            <a:ext cx="10515600" cy="4351338"/>
+          </a:xfrm>
+        </p:spPr>
         <p:txBody>
           <a:bodyPr/>
           <a:lstStyle/>
           <a:p>
             <a:r>
-              <a:rPr lang="en-CA" dirty="0"/>
+              <a:rPr lang="en-CA" dirty="0">
+                <a:latin typeface="Lato" panose="020F0502020204030203" pitchFamily="34" charset="0"/>
+                <a:ea typeface="Lato" panose="020F0502020204030203" pitchFamily="34" charset="0"/>
+                <a:cs typeface="Lato" panose="020F0502020204030203" pitchFamily="34" charset="0"/>
+              </a:rPr>
               <a:t>Stakeholders</a:t>
             </a:r>
           </a:p>
           <a:p>
             <a:pPr lvl="1"/>
             <a:r>
-              <a:rPr lang="en-CA" dirty="0"/>
+              <a:rPr lang="en-CA" dirty="0">
+                <a:latin typeface="Lato" panose="020F0502020204030203" pitchFamily="34" charset="0"/>
+                <a:ea typeface="Lato" panose="020F0502020204030203" pitchFamily="34" charset="0"/>
+                <a:cs typeface="Lato" panose="020F0502020204030203" pitchFamily="34" charset="0"/>
+              </a:rPr>
               <a:t>Students</a:t>
             </a:r>
           </a:p>
           <a:p>
             <a:pPr lvl="1"/>
             <a:r>
-              <a:rPr lang="en-CA" dirty="0"/>
+              <a:rPr lang="en-CA" dirty="0">
+                <a:latin typeface="Lato" panose="020F0502020204030203" pitchFamily="34" charset="0"/>
+                <a:ea typeface="Lato" panose="020F0502020204030203" pitchFamily="34" charset="0"/>
+                <a:cs typeface="Lato" panose="020F0502020204030203" pitchFamily="34" charset="0"/>
+              </a:rPr>
               <a:t>Professors</a:t>
             </a:r>
           </a:p>
           <a:p>
             <a:pPr lvl="1"/>
-            <a:endParaRPr lang="en-CA" dirty="0"/>
-          </a:p>
-          <a:p>
-            <a:r>
-              <a:rPr lang="en-CA" dirty="0"/>
+            <a:endParaRPr lang="en-CA" dirty="0">
+              <a:latin typeface="Lato" panose="020F0502020204030203" pitchFamily="34" charset="0"/>
+              <a:ea typeface="Lato" panose="020F0502020204030203" pitchFamily="34" charset="0"/>
+              <a:cs typeface="Lato" panose="020F0502020204030203" pitchFamily="34" charset="0"/>
+            </a:endParaRPr>
+          </a:p>
+          <a:p>
+            <a:r>
+              <a:rPr lang="en-CA" dirty="0">
+                <a:latin typeface="Lato" panose="020F0502020204030203" pitchFamily="34" charset="0"/>
+                <a:ea typeface="Lato" panose="020F0502020204030203" pitchFamily="34" charset="0"/>
+                <a:cs typeface="Lato" panose="020F0502020204030203" pitchFamily="34" charset="0"/>
+              </a:rPr>
               <a:t>Existing Implementation</a:t>
             </a:r>
+          </a:p>
+        </p:txBody>
+      </p:sp>
+      <p:sp>
+        <p:nvSpPr>
+          <p:cNvPr id="4" name="Oval 3">
+            <a:extLst>
+              <a:ext uri="{FF2B5EF4-FFF2-40B4-BE49-F238E27FC236}">
+                <a16:creationId xmlns:a16="http://schemas.microsoft.com/office/drawing/2014/main" id="{1C08CB3E-F715-48A7-8255-24B1E842B719}"/>
+              </a:ext>
+            </a:extLst>
+          </p:cNvPr>
+          <p:cNvSpPr/>
+          <p:nvPr/>
+        </p:nvSpPr>
+        <p:spPr>
+          <a:xfrm>
+            <a:off x="9519139" y="-1336431"/>
+            <a:ext cx="2672861" cy="2672861"/>
+          </a:xfrm>
+          <a:prstGeom prst="ellipse">
+            <a:avLst/>
+          </a:prstGeom>
+          <a:solidFill>
+            <a:srgbClr val="980404"/>
+          </a:solidFill>
+          <a:ln>
+            <a:noFill/>
+          </a:ln>
+        </p:spPr>
+        <p:style>
+          <a:lnRef idx="2">
+            <a:schemeClr val="accent1">
+              <a:shade val="50000"/>
+            </a:schemeClr>
+          </a:lnRef>
+          <a:fillRef idx="1">
+            <a:schemeClr val="accent1"/>
+          </a:fillRef>
+          <a:effectRef idx="0">
+            <a:schemeClr val="accent1"/>
+          </a:effectRef>
+          <a:fontRef idx="minor">
+            <a:schemeClr val="lt1"/>
+          </a:fontRef>
+        </p:style>
+        <p:txBody>
+          <a:bodyPr rtlCol="0" anchor="ctr"/>
+          <a:lstStyle/>
+          <a:p>
+            <a:pPr algn="ctr"/>
+            <a:endParaRPr lang="en-CA"/>
+          </a:p>
+        </p:txBody>
+      </p:sp>
+      <p:sp>
+        <p:nvSpPr>
+          <p:cNvPr id="5" name="Oval 4">
+            <a:extLst>
+              <a:ext uri="{FF2B5EF4-FFF2-40B4-BE49-F238E27FC236}">
+                <a16:creationId xmlns:a16="http://schemas.microsoft.com/office/drawing/2014/main" id="{1633B9E2-BCE4-4BF6-843C-28F8F90ABDA7}"/>
+              </a:ext>
+            </a:extLst>
+          </p:cNvPr>
+          <p:cNvSpPr/>
+          <p:nvPr/>
+        </p:nvSpPr>
+        <p:spPr>
+          <a:xfrm>
+            <a:off x="10855569" y="-593719"/>
+            <a:ext cx="2672861" cy="2672861"/>
+          </a:xfrm>
+          <a:prstGeom prst="ellipse">
+            <a:avLst/>
+          </a:prstGeom>
+          <a:solidFill>
+            <a:srgbClr val="999999"/>
+          </a:solidFill>
+          <a:ln>
+            <a:noFill/>
+          </a:ln>
+        </p:spPr>
+        <p:style>
+          <a:lnRef idx="2">
+            <a:schemeClr val="accent1">
+              <a:shade val="50000"/>
+            </a:schemeClr>
+          </a:lnRef>
+          <a:fillRef idx="1">
+            <a:schemeClr val="accent1"/>
+          </a:fillRef>
+          <a:effectRef idx="0">
+            <a:schemeClr val="accent1"/>
+          </a:effectRef>
+          <a:fontRef idx="minor">
+            <a:schemeClr val="lt1"/>
+          </a:fontRef>
+        </p:style>
+        <p:txBody>
+          <a:bodyPr rtlCol="0" anchor="ctr"/>
+          <a:lstStyle/>
+          <a:p>
+            <a:pPr algn="ctr"/>
+            <a:endParaRPr lang="en-CA"/>
+          </a:p>
+        </p:txBody>
+      </p:sp>
+      <p:sp>
+        <p:nvSpPr>
+          <p:cNvPr id="7" name="Oval 6">
+            <a:extLst>
+              <a:ext uri="{FF2B5EF4-FFF2-40B4-BE49-F238E27FC236}">
+                <a16:creationId xmlns:a16="http://schemas.microsoft.com/office/drawing/2014/main" id="{C3B70E9A-3A68-4060-9F83-5FADE626826D}"/>
+              </a:ext>
+            </a:extLst>
+          </p:cNvPr>
+          <p:cNvSpPr/>
+          <p:nvPr/>
+        </p:nvSpPr>
+        <p:spPr>
+          <a:xfrm>
+            <a:off x="-1164101" y="5704449"/>
+            <a:ext cx="2672861" cy="2672861"/>
+          </a:xfrm>
+          <a:prstGeom prst="ellipse">
+            <a:avLst/>
+          </a:prstGeom>
+          <a:solidFill>
+            <a:srgbClr val="980404"/>
+          </a:solidFill>
+          <a:ln>
+            <a:noFill/>
+          </a:ln>
+        </p:spPr>
+        <p:style>
+          <a:lnRef idx="2">
+            <a:schemeClr val="accent1">
+              <a:shade val="50000"/>
+            </a:schemeClr>
+          </a:lnRef>
+          <a:fillRef idx="1">
+            <a:schemeClr val="accent1"/>
+          </a:fillRef>
+          <a:effectRef idx="0">
+            <a:schemeClr val="accent1"/>
+          </a:effectRef>
+          <a:fontRef idx="minor">
+            <a:schemeClr val="lt1"/>
+          </a:fontRef>
+        </p:style>
+        <p:txBody>
+          <a:bodyPr rtlCol="0" anchor="ctr"/>
+          <a:lstStyle/>
+          <a:p>
+            <a:pPr algn="ctr"/>
+            <a:endParaRPr lang="en-CA"/>
           </a:p>
         </p:txBody>
       </p:sp>
@@ -3682,7 +4346,12 @@
           <a:lstStyle/>
           <a:p>
             <a:r>
-              <a:rPr lang="en-CA" dirty="0"/>
+              <a:rPr lang="en-CA" dirty="0">
+                <a:solidFill>
+                  <a:srgbClr val="980404"/>
+                </a:solidFill>
+                <a:latin typeface="Lora" panose="00000500000000000000" pitchFamily="2" charset="0"/>
+              </a:rPr>
               <a:t>Current Implementation</a:t>
             </a:r>
           </a:p>
@@ -3709,68 +4378,324 @@
           <a:bodyPr/>
           <a:lstStyle/>
           <a:p>
-            <a:r>
-              <a:rPr lang="en-CA" dirty="0"/>
+            <a:pPr>
+              <a:buFont typeface="Wingdings" panose="05000000000000000000" pitchFamily="2" charset="2"/>
+              <a:buChar char="§"/>
+            </a:pPr>
+            <a:r>
+              <a:rPr lang="en-CA" dirty="0">
+                <a:latin typeface="Lato" panose="020F0502020204030203" pitchFamily="34" charset="0"/>
+                <a:ea typeface="Lato" panose="020F0502020204030203" pitchFamily="34" charset="0"/>
+                <a:cs typeface="Lato" panose="020F0502020204030203" pitchFamily="34" charset="0"/>
+              </a:rPr>
               <a:t>Functionality Added</a:t>
             </a:r>
           </a:p>
           <a:p>
-            <a:pPr marL="457200" lvl="1" indent="0">
-              <a:buNone/>
-            </a:pPr>
-            <a:r>
-              <a:rPr lang="en-CA" dirty="0"/>
-              <a:t>-&gt; Login. </a:t>
-            </a:r>
-          </a:p>
-          <a:p>
-            <a:pPr marL="457200" lvl="1" indent="0">
-              <a:buNone/>
-            </a:pPr>
-            <a:r>
-              <a:rPr lang="en-CA" dirty="0"/>
-              <a:t>-&gt; Collect Current Courses.</a:t>
-            </a:r>
-          </a:p>
-          <a:p>
-            <a:pPr marL="457200" lvl="1" indent="0">
-              <a:buNone/>
-            </a:pPr>
-            <a:r>
-              <a:rPr lang="en-CA" dirty="0"/>
-              <a:t>-&gt; Collect Assignment Information. </a:t>
-            </a:r>
-          </a:p>
-          <a:p>
-            <a:pPr marL="457200" lvl="1" indent="0">
-              <a:buNone/>
-            </a:pPr>
-            <a:r>
-              <a:rPr lang="en-CA" dirty="0"/>
-              <a:t>-&gt; Collect Quiz Information.</a:t>
-            </a:r>
-          </a:p>
-          <a:p>
-            <a:pPr marL="457200" lvl="1" indent="0">
-              <a:buNone/>
-            </a:pPr>
-            <a:r>
-              <a:rPr lang="en-CA" dirty="0"/>
-              <a:t>-&gt; Filter Information for upcoming/incomplete tasks.</a:t>
-            </a:r>
-          </a:p>
-          <a:p>
-            <a:pPr marL="457200" lvl="1" indent="0">
-              <a:buNone/>
-            </a:pPr>
-            <a:r>
-              <a:rPr lang="en-CA" dirty="0"/>
-              <a:t>-&gt; Display Information in GUI</a:t>
-            </a:r>
-          </a:p>
-          <a:p>
             <a:pPr lvl="1"/>
-            <a:endParaRPr lang="en-CA" dirty="0"/>
+            <a:r>
+              <a:rPr lang="en-CA" dirty="0">
+                <a:latin typeface="Lato" panose="020F0502020204030203" pitchFamily="34" charset="0"/>
+                <a:ea typeface="Lato" panose="020F0502020204030203" pitchFamily="34" charset="0"/>
+                <a:cs typeface="Lato" panose="020F0502020204030203" pitchFamily="34" charset="0"/>
+              </a:rPr>
+              <a:t>Login. </a:t>
+            </a:r>
+          </a:p>
+          <a:p>
+            <a:pPr lvl="1"/>
+            <a:r>
+              <a:rPr lang="en-CA" dirty="0">
+                <a:latin typeface="Lato" panose="020F0502020204030203" pitchFamily="34" charset="0"/>
+                <a:ea typeface="Lato" panose="020F0502020204030203" pitchFamily="34" charset="0"/>
+                <a:cs typeface="Lato" panose="020F0502020204030203" pitchFamily="34" charset="0"/>
+              </a:rPr>
+              <a:t>Collect Current Courses.</a:t>
+            </a:r>
+          </a:p>
+          <a:p>
+            <a:pPr lvl="1"/>
+            <a:r>
+              <a:rPr lang="en-CA" dirty="0">
+                <a:latin typeface="Lato" panose="020F0502020204030203" pitchFamily="34" charset="0"/>
+                <a:ea typeface="Lato" panose="020F0502020204030203" pitchFamily="34" charset="0"/>
+                <a:cs typeface="Lato" panose="020F0502020204030203" pitchFamily="34" charset="0"/>
+              </a:rPr>
+              <a:t>Collect Assignment Information. </a:t>
+            </a:r>
+          </a:p>
+          <a:p>
+            <a:pPr lvl="1"/>
+            <a:r>
+              <a:rPr lang="en-CA" dirty="0">
+                <a:latin typeface="Lato" panose="020F0502020204030203" pitchFamily="34" charset="0"/>
+                <a:ea typeface="Lato" panose="020F0502020204030203" pitchFamily="34" charset="0"/>
+                <a:cs typeface="Lato" panose="020F0502020204030203" pitchFamily="34" charset="0"/>
+              </a:rPr>
+              <a:t>Collect Quiz Information.</a:t>
+            </a:r>
+          </a:p>
+          <a:p>
+            <a:pPr lvl="1"/>
+            <a:r>
+              <a:rPr lang="en-CA" dirty="0">
+                <a:latin typeface="Lato" panose="020F0502020204030203" pitchFamily="34" charset="0"/>
+                <a:ea typeface="Lato" panose="020F0502020204030203" pitchFamily="34" charset="0"/>
+                <a:cs typeface="Lato" panose="020F0502020204030203" pitchFamily="34" charset="0"/>
+              </a:rPr>
+              <a:t>Filter Information for upcoming/incomplete tasks.</a:t>
+            </a:r>
+          </a:p>
+          <a:p>
+            <a:pPr lvl="1"/>
+            <a:r>
+              <a:rPr lang="en-CA" dirty="0">
+                <a:latin typeface="Lato" panose="020F0502020204030203" pitchFamily="34" charset="0"/>
+                <a:ea typeface="Lato" panose="020F0502020204030203" pitchFamily="34" charset="0"/>
+                <a:cs typeface="Lato" panose="020F0502020204030203" pitchFamily="34" charset="0"/>
+              </a:rPr>
+              <a:t>Display Information in GUI</a:t>
+            </a:r>
+          </a:p>
+          <a:p>
+            <a:pPr lvl="1"/>
+            <a:endParaRPr lang="en-CA" dirty="0">
+              <a:latin typeface="Lato" panose="020F0502020204030203" pitchFamily="34" charset="0"/>
+              <a:ea typeface="Lato" panose="020F0502020204030203" pitchFamily="34" charset="0"/>
+              <a:cs typeface="Lato" panose="020F0502020204030203" pitchFamily="34" charset="0"/>
+            </a:endParaRPr>
+          </a:p>
+        </p:txBody>
+      </p:sp>
+      <p:sp>
+        <p:nvSpPr>
+          <p:cNvPr id="4" name="Circle: Hollow 3">
+            <a:extLst>
+              <a:ext uri="{FF2B5EF4-FFF2-40B4-BE49-F238E27FC236}">
+                <a16:creationId xmlns:a16="http://schemas.microsoft.com/office/drawing/2014/main" id="{ACEFBADB-431C-4EF5-B3A0-97C80821FC31}"/>
+              </a:ext>
+            </a:extLst>
+          </p:cNvPr>
+          <p:cNvSpPr/>
+          <p:nvPr/>
+        </p:nvSpPr>
+        <p:spPr>
+          <a:xfrm>
+            <a:off x="10393680" y="5241777"/>
+            <a:ext cx="2672861" cy="2672861"/>
+          </a:xfrm>
+          <a:prstGeom prst="donut">
+            <a:avLst>
+              <a:gd name="adj" fmla="val 8004"/>
+            </a:avLst>
+          </a:prstGeom>
+          <a:solidFill>
+            <a:srgbClr val="980404"/>
+          </a:solidFill>
+          <a:ln>
+            <a:noFill/>
+          </a:ln>
+        </p:spPr>
+        <p:style>
+          <a:lnRef idx="2">
+            <a:schemeClr val="accent1">
+              <a:shade val="50000"/>
+            </a:schemeClr>
+          </a:lnRef>
+          <a:fillRef idx="1">
+            <a:schemeClr val="accent1"/>
+          </a:fillRef>
+          <a:effectRef idx="0">
+            <a:schemeClr val="accent1"/>
+          </a:effectRef>
+          <a:fontRef idx="minor">
+            <a:schemeClr val="lt1"/>
+          </a:fontRef>
+        </p:style>
+        <p:txBody>
+          <a:bodyPr rtlCol="0" anchor="ctr"/>
+          <a:lstStyle/>
+          <a:p>
+            <a:pPr algn="ctr"/>
+            <a:endParaRPr lang="en-CA">
+              <a:solidFill>
+                <a:schemeClr val="tx1"/>
+              </a:solidFill>
+            </a:endParaRPr>
+          </a:p>
+        </p:txBody>
+      </p:sp>
+      <p:sp>
+        <p:nvSpPr>
+          <p:cNvPr id="5" name="Circle: Hollow 4">
+            <a:extLst>
+              <a:ext uri="{FF2B5EF4-FFF2-40B4-BE49-F238E27FC236}">
+                <a16:creationId xmlns:a16="http://schemas.microsoft.com/office/drawing/2014/main" id="{69B258E1-942D-48FE-8390-16AD6C7F84FC}"/>
+              </a:ext>
+            </a:extLst>
+          </p:cNvPr>
+          <p:cNvSpPr/>
+          <p:nvPr/>
+        </p:nvSpPr>
+        <p:spPr>
+          <a:xfrm>
+            <a:off x="10722123" y="5570220"/>
+            <a:ext cx="2035807" cy="2035807"/>
+          </a:xfrm>
+          <a:prstGeom prst="donut">
+            <a:avLst>
+              <a:gd name="adj" fmla="val 8004"/>
+            </a:avLst>
+          </a:prstGeom>
+          <a:solidFill>
+            <a:srgbClr val="999999"/>
+          </a:solidFill>
+          <a:ln>
+            <a:noFill/>
+          </a:ln>
+        </p:spPr>
+        <p:style>
+          <a:lnRef idx="2">
+            <a:schemeClr val="accent1">
+              <a:shade val="50000"/>
+            </a:schemeClr>
+          </a:lnRef>
+          <a:fillRef idx="1">
+            <a:schemeClr val="accent1"/>
+          </a:fillRef>
+          <a:effectRef idx="0">
+            <a:schemeClr val="accent1"/>
+          </a:effectRef>
+          <a:fontRef idx="minor">
+            <a:schemeClr val="lt1"/>
+          </a:fontRef>
+        </p:style>
+        <p:txBody>
+          <a:bodyPr rtlCol="0" anchor="ctr"/>
+          <a:lstStyle/>
+          <a:p>
+            <a:pPr algn="ctr"/>
+            <a:endParaRPr lang="en-CA">
+              <a:solidFill>
+                <a:schemeClr val="tx1"/>
+              </a:solidFill>
+            </a:endParaRPr>
+          </a:p>
+        </p:txBody>
+      </p:sp>
+      <p:sp>
+        <p:nvSpPr>
+          <p:cNvPr id="8" name="Circle: Hollow 7">
+            <a:extLst>
+              <a:ext uri="{FF2B5EF4-FFF2-40B4-BE49-F238E27FC236}">
+                <a16:creationId xmlns:a16="http://schemas.microsoft.com/office/drawing/2014/main" id="{7A7E2324-0176-4FB2-A9AD-66D7F245F98B}"/>
+              </a:ext>
+            </a:extLst>
+          </p:cNvPr>
+          <p:cNvSpPr/>
+          <p:nvPr/>
+        </p:nvSpPr>
+        <p:spPr>
+          <a:xfrm>
+            <a:off x="10927080" y="3750614"/>
+            <a:ext cx="3021990" cy="3021990"/>
+          </a:xfrm>
+          <a:prstGeom prst="donut">
+            <a:avLst>
+              <a:gd name="adj" fmla="val 8004"/>
+            </a:avLst>
+          </a:prstGeom>
+          <a:solidFill>
+            <a:srgbClr val="980404"/>
+          </a:solidFill>
+          <a:ln>
+            <a:noFill/>
+          </a:ln>
+        </p:spPr>
+        <p:style>
+          <a:lnRef idx="2">
+            <a:schemeClr val="accent1">
+              <a:shade val="50000"/>
+            </a:schemeClr>
+          </a:lnRef>
+          <a:fillRef idx="1">
+            <a:schemeClr val="accent1"/>
+          </a:fillRef>
+          <a:effectRef idx="0">
+            <a:schemeClr val="accent1"/>
+          </a:effectRef>
+          <a:fontRef idx="minor">
+            <a:schemeClr val="lt1"/>
+          </a:fontRef>
+        </p:style>
+        <p:txBody>
+          <a:bodyPr rtlCol="0" anchor="ctr"/>
+          <a:lstStyle/>
+          <a:p>
+            <a:pPr algn="ctr"/>
+            <a:endParaRPr lang="en-CA">
+              <a:solidFill>
+                <a:schemeClr val="tx1"/>
+              </a:solidFill>
+            </a:endParaRPr>
+          </a:p>
+        </p:txBody>
+      </p:sp>
+      <p:sp>
+        <p:nvSpPr>
+          <p:cNvPr id="9" name="Circle: Hollow 8">
+            <a:extLst>
+              <a:ext uri="{FF2B5EF4-FFF2-40B4-BE49-F238E27FC236}">
+                <a16:creationId xmlns:a16="http://schemas.microsoft.com/office/drawing/2014/main" id="{B5C4506B-31C2-454C-B10B-9E4FAA326929}"/>
+              </a:ext>
+            </a:extLst>
+          </p:cNvPr>
+          <p:cNvSpPr/>
+          <p:nvPr/>
+        </p:nvSpPr>
+        <p:spPr>
+          <a:xfrm>
+            <a:off x="11286003" y="4101309"/>
+            <a:ext cx="2301724" cy="2301724"/>
+          </a:xfrm>
+          <a:prstGeom prst="donut">
+            <a:avLst>
+              <a:gd name="adj" fmla="val 8004"/>
+            </a:avLst>
+          </a:prstGeom>
+          <a:solidFill>
+            <a:srgbClr val="999999"/>
+          </a:solidFill>
+          <a:ln>
+            <a:noFill/>
+          </a:ln>
+        </p:spPr>
+        <p:style>
+          <a:lnRef idx="2">
+            <a:schemeClr val="accent1">
+              <a:shade val="50000"/>
+            </a:schemeClr>
+          </a:lnRef>
+          <a:fillRef idx="1">
+            <a:schemeClr val="accent1"/>
+          </a:fillRef>
+          <a:effectRef idx="0">
+            <a:schemeClr val="accent1"/>
+          </a:effectRef>
+          <a:fontRef idx="minor">
+            <a:schemeClr val="lt1"/>
+          </a:fontRef>
+        </p:style>
+        <p:txBody>
+          <a:bodyPr rtlCol="0" anchor="ctr"/>
+          <a:lstStyle/>
+          <a:p>
+            <a:pPr algn="ctr"/>
+            <a:endParaRPr lang="en-CA">
+              <a:solidFill>
+                <a:schemeClr val="tx1"/>
+              </a:solidFill>
+            </a:endParaRPr>
           </a:p>
         </p:txBody>
       </p:sp>
@@ -3826,7 +4751,11 @@
           <a:lstStyle/>
           <a:p>
             <a:r>
-              <a:rPr lang="en-CA" dirty="0"/>
+              <a:rPr lang="en-CA" dirty="0">
+                <a:solidFill>
+                  <a:srgbClr val="980404"/>
+                </a:solidFill>
+              </a:rPr>
               <a:t>Software Qualities and Verification</a:t>
             </a:r>
           </a:p>
@@ -3847,13 +4776,13 @@
           <p:nvPr>
             <p:extLst>
               <p:ext uri="{D42A27DB-BD31-4B8C-83A1-F6EECF244321}">
-                <p14:modId xmlns:p14="http://schemas.microsoft.com/office/powerpoint/2010/main" val="2103343204"/>
+                <p14:modId xmlns:p14="http://schemas.microsoft.com/office/powerpoint/2010/main" val="1190652107"/>
               </p:ext>
             </p:extLst>
           </p:nvPr>
         </p:nvGraphicFramePr>
         <p:xfrm>
-          <a:off x="1031846" y="1778466"/>
+          <a:off x="1733259" y="1690688"/>
           <a:ext cx="8725482" cy="4487811"/>
         </p:xfrm>
         <a:graphic>
@@ -3885,12 +4814,25 @@
                     <a:lstStyle/>
                     <a:p>
                       <a:r>
-                        <a:rPr lang="en-CA" dirty="0"/>
+                        <a:rPr lang="en-CA" dirty="0">
+                          <a:solidFill>
+                            <a:srgbClr val="980404"/>
+                          </a:solidFill>
+                          <a:latin typeface="Lato" panose="020F0502020204030203" pitchFamily="34" charset="0"/>
+                          <a:ea typeface="Lato" panose="020F0502020204030203" pitchFamily="34" charset="0"/>
+                          <a:cs typeface="Lato" panose="020F0502020204030203" pitchFamily="34" charset="0"/>
+                        </a:rPr>
                         <a:t>Quality</a:t>
                       </a:r>
                     </a:p>
                   </a:txBody>
-                  <a:tcPr/>
+                  <a:tcPr>
+                    <a:solidFill>
+                      <a:schemeClr val="bg1">
+                        <a:lumMod val="65000"/>
+                      </a:schemeClr>
+                    </a:solidFill>
+                  </a:tcPr>
                 </a:tc>
                 <a:tc>
                   <a:txBody>
@@ -3898,12 +4840,25 @@
                     <a:lstStyle/>
                     <a:p>
                       <a:r>
-                        <a:rPr lang="en-CA" dirty="0"/>
+                        <a:rPr lang="en-CA" dirty="0">
+                          <a:solidFill>
+                            <a:srgbClr val="980404"/>
+                          </a:solidFill>
+                          <a:latin typeface="Lato" panose="020F0502020204030203" pitchFamily="34" charset="0"/>
+                          <a:ea typeface="Lato" panose="020F0502020204030203" pitchFamily="34" charset="0"/>
+                          <a:cs typeface="Lato" panose="020F0502020204030203" pitchFamily="34" charset="0"/>
+                        </a:rPr>
                         <a:t>Test Rating- Out of 5</a:t>
                       </a:r>
                     </a:p>
                   </a:txBody>
-                  <a:tcPr/>
+                  <a:tcPr>
+                    <a:solidFill>
+                      <a:schemeClr val="bg1">
+                        <a:lumMod val="65000"/>
+                      </a:schemeClr>
+                    </a:solidFill>
+                  </a:tcPr>
                 </a:tc>
                 <a:extLst>
                   <a:ext uri="{0D108BD9-81ED-4DB2-BD59-A6C34878D82A}">
@@ -3918,12 +4873,22 @@
                     <a:lstStyle/>
                     <a:p>
                       <a:r>
-                        <a:rPr lang="en-CA" dirty="0"/>
+                        <a:rPr lang="en-CA" dirty="0">
+                          <a:latin typeface="Lato" panose="020F0502020204030203" pitchFamily="34" charset="0"/>
+                          <a:ea typeface="Lato" panose="020F0502020204030203" pitchFamily="34" charset="0"/>
+                          <a:cs typeface="Lato" panose="020F0502020204030203" pitchFamily="34" charset="0"/>
+                        </a:rPr>
                         <a:t>User-friendliness</a:t>
                       </a:r>
                     </a:p>
                   </a:txBody>
-                  <a:tcPr/>
+                  <a:tcPr>
+                    <a:solidFill>
+                      <a:schemeClr val="bg1">
+                        <a:lumMod val="85000"/>
+                      </a:schemeClr>
+                    </a:solidFill>
+                  </a:tcPr>
                 </a:tc>
                 <a:tc>
                   <a:txBody>
@@ -3931,12 +4896,22 @@
                     <a:lstStyle/>
                     <a:p>
                       <a:r>
-                        <a:rPr lang="en-CA" dirty="0"/>
+                        <a:rPr lang="en-CA" dirty="0">
+                          <a:latin typeface="Lato" panose="020F0502020204030203" pitchFamily="34" charset="0"/>
+                          <a:ea typeface="Lato" panose="020F0502020204030203" pitchFamily="34" charset="0"/>
+                          <a:cs typeface="Lato" panose="020F0502020204030203" pitchFamily="34" charset="0"/>
+                        </a:rPr>
                         <a:t>4 – Even though a user guide is not presented, the application is very easy to navigate through and understand.</a:t>
                       </a:r>
                     </a:p>
                   </a:txBody>
-                  <a:tcPr/>
+                  <a:tcPr>
+                    <a:solidFill>
+                      <a:schemeClr val="bg1">
+                        <a:lumMod val="85000"/>
+                      </a:schemeClr>
+                    </a:solidFill>
+                  </a:tcPr>
                 </a:tc>
                 <a:extLst>
                   <a:ext uri="{0D108BD9-81ED-4DB2-BD59-A6C34878D82A}">
@@ -3951,12 +4926,22 @@
                     <a:lstStyle/>
                     <a:p>
                       <a:r>
-                        <a:rPr lang="en-CA" dirty="0"/>
+                        <a:rPr lang="en-CA" dirty="0">
+                          <a:latin typeface="Lato" panose="020F0502020204030203" pitchFamily="34" charset="0"/>
+                          <a:ea typeface="Lato" panose="020F0502020204030203" pitchFamily="34" charset="0"/>
+                          <a:cs typeface="Lato" panose="020F0502020204030203" pitchFamily="34" charset="0"/>
+                        </a:rPr>
                         <a:t>Portability</a:t>
                       </a:r>
                     </a:p>
                   </a:txBody>
-                  <a:tcPr/>
+                  <a:tcPr>
+                    <a:solidFill>
+                      <a:schemeClr val="bg1">
+                        <a:lumMod val="95000"/>
+                      </a:schemeClr>
+                    </a:solidFill>
+                  </a:tcPr>
                 </a:tc>
                 <a:tc>
                   <a:txBody>
@@ -3964,12 +4949,22 @@
                     <a:lstStyle/>
                     <a:p>
                       <a:r>
-                        <a:rPr lang="en-CA" dirty="0"/>
+                        <a:rPr lang="en-CA" dirty="0">
+                          <a:latin typeface="Lato" panose="020F0502020204030203" pitchFamily="34" charset="0"/>
+                          <a:ea typeface="Lato" panose="020F0502020204030203" pitchFamily="34" charset="0"/>
+                          <a:cs typeface="Lato" panose="020F0502020204030203" pitchFamily="34" charset="0"/>
+                        </a:rPr>
                         <a:t>5 – The usage of React-Native to implement the frontend allows the application to be very portable making it usable on a mobile device.</a:t>
                       </a:r>
                     </a:p>
                   </a:txBody>
-                  <a:tcPr/>
+                  <a:tcPr>
+                    <a:solidFill>
+                      <a:schemeClr val="bg1">
+                        <a:lumMod val="95000"/>
+                      </a:schemeClr>
+                    </a:solidFill>
+                  </a:tcPr>
                 </a:tc>
                 <a:extLst>
                   <a:ext uri="{0D108BD9-81ED-4DB2-BD59-A6C34878D82A}">
@@ -3984,12 +4979,22 @@
                     <a:lstStyle/>
                     <a:p>
                       <a:r>
-                        <a:rPr lang="en-CA" dirty="0"/>
+                        <a:rPr lang="en-CA" dirty="0">
+                          <a:latin typeface="Lato" panose="020F0502020204030203" pitchFamily="34" charset="0"/>
+                          <a:ea typeface="Lato" panose="020F0502020204030203" pitchFamily="34" charset="0"/>
+                          <a:cs typeface="Lato" panose="020F0502020204030203" pitchFamily="34" charset="0"/>
+                        </a:rPr>
                         <a:t>Performance</a:t>
                       </a:r>
                     </a:p>
                   </a:txBody>
-                  <a:tcPr/>
+                  <a:tcPr>
+                    <a:solidFill>
+                      <a:schemeClr val="bg1">
+                        <a:lumMod val="85000"/>
+                      </a:schemeClr>
+                    </a:solidFill>
+                  </a:tcPr>
                 </a:tc>
                 <a:tc>
                   <a:txBody>
@@ -3997,12 +5002,22 @@
                     <a:lstStyle/>
                     <a:p>
                       <a:r>
-                        <a:rPr lang="en-CA" dirty="0"/>
+                        <a:rPr lang="en-CA" dirty="0">
+                          <a:latin typeface="Lato" panose="020F0502020204030203" pitchFamily="34" charset="0"/>
+                          <a:ea typeface="Lato" panose="020F0502020204030203" pitchFamily="34" charset="0"/>
+                          <a:cs typeface="Lato" panose="020F0502020204030203" pitchFamily="34" charset="0"/>
+                        </a:rPr>
                         <a:t>5 – The performance of the application is very smooth, the web-scraping however depends on the performance of A2L.</a:t>
                       </a:r>
                     </a:p>
                   </a:txBody>
-                  <a:tcPr/>
+                  <a:tcPr>
+                    <a:solidFill>
+                      <a:schemeClr val="bg1">
+                        <a:lumMod val="85000"/>
+                      </a:schemeClr>
+                    </a:solidFill>
+                  </a:tcPr>
                 </a:tc>
                 <a:extLst>
                   <a:ext uri="{0D108BD9-81ED-4DB2-BD59-A6C34878D82A}">
@@ -4017,12 +5032,22 @@
                     <a:lstStyle/>
                     <a:p>
                       <a:r>
-                        <a:rPr lang="en-CA" dirty="0"/>
+                        <a:rPr lang="en-CA" dirty="0">
+                          <a:latin typeface="Lato" panose="020F0502020204030203" pitchFamily="34" charset="0"/>
+                          <a:ea typeface="Lato" panose="020F0502020204030203" pitchFamily="34" charset="0"/>
+                          <a:cs typeface="Lato" panose="020F0502020204030203" pitchFamily="34" charset="0"/>
+                        </a:rPr>
                         <a:t>Usability</a:t>
                       </a:r>
                     </a:p>
                   </a:txBody>
-                  <a:tcPr/>
+                  <a:tcPr>
+                    <a:solidFill>
+                      <a:schemeClr val="bg1">
+                        <a:lumMod val="95000"/>
+                      </a:schemeClr>
+                    </a:solidFill>
+                  </a:tcPr>
                 </a:tc>
                 <a:tc>
                   <a:txBody>
@@ -4030,12 +5055,22 @@
                     <a:lstStyle/>
                     <a:p>
                       <a:r>
-                        <a:rPr lang="en-CA" dirty="0"/>
+                        <a:rPr lang="en-CA" dirty="0">
+                          <a:latin typeface="Lato" panose="020F0502020204030203" pitchFamily="34" charset="0"/>
+                          <a:ea typeface="Lato" panose="020F0502020204030203" pitchFamily="34" charset="0"/>
+                          <a:cs typeface="Lato" panose="020F0502020204030203" pitchFamily="34" charset="0"/>
+                        </a:rPr>
                         <a:t>5- The application is very effective at collecting and displaying the information in an organized manner.</a:t>
                       </a:r>
                     </a:p>
                   </a:txBody>
-                  <a:tcPr/>
+                  <a:tcPr>
+                    <a:solidFill>
+                      <a:schemeClr val="bg1">
+                        <a:lumMod val="95000"/>
+                      </a:schemeClr>
+                    </a:solidFill>
+                  </a:tcPr>
                 </a:tc>
                 <a:extLst>
                   <a:ext uri="{0D108BD9-81ED-4DB2-BD59-A6C34878D82A}">
@@ -4099,7 +5134,12 @@
           <a:lstStyle/>
           <a:p>
             <a:r>
-              <a:rPr lang="en-CA" dirty="0"/>
+              <a:rPr lang="en-CA" dirty="0">
+                <a:solidFill>
+                  <a:srgbClr val="980404"/>
+                </a:solidFill>
+                <a:latin typeface="Lora" panose="00000500000000000000" pitchFamily="2" charset="0"/>
+              </a:rPr>
               <a:t>Testing</a:t>
             </a:r>
           </a:p>
@@ -4179,18 +5219,394 @@
             <p:ph type="title"/>
           </p:nvPr>
         </p:nvSpPr>
-        <p:spPr/>
+        <p:spPr>
+          <a:xfrm>
+            <a:off x="4427220" y="2766218"/>
+            <a:ext cx="3337560" cy="1325563"/>
+          </a:xfrm>
+        </p:spPr>
         <p:txBody>
           <a:bodyPr/>
           <a:lstStyle/>
           <a:p>
             <a:r>
-              <a:rPr lang="en-CA" dirty="0"/>
-              <a:t>Questions</a:t>
-            </a:r>
-          </a:p>
-        </p:txBody>
-      </p:sp>
+              <a:rPr lang="en-CA" dirty="0">
+                <a:solidFill>
+                  <a:srgbClr val="980404"/>
+                </a:solidFill>
+                <a:latin typeface="Lora" panose="00000500000000000000" pitchFamily="2" charset="0"/>
+              </a:rPr>
+              <a:t>Questions?</a:t>
+            </a:r>
+          </a:p>
+        </p:txBody>
+      </p:sp>
+      <p:grpSp>
+        <p:nvGrpSpPr>
+          <p:cNvPr id="6" name="Group 5">
+            <a:extLst>
+              <a:ext uri="{FF2B5EF4-FFF2-40B4-BE49-F238E27FC236}">
+                <a16:creationId xmlns:a16="http://schemas.microsoft.com/office/drawing/2014/main" id="{56EBB9DE-C3E2-403A-BEC0-52067F1E3B25}"/>
+              </a:ext>
+            </a:extLst>
+          </p:cNvPr>
+          <p:cNvGrpSpPr/>
+          <p:nvPr/>
+        </p:nvGrpSpPr>
+        <p:grpSpPr>
+          <a:xfrm rot="15526026">
+            <a:off x="-2021910" y="4097098"/>
+            <a:ext cx="5775959" cy="4582014"/>
+            <a:chOff x="7299961" y="3758041"/>
+            <a:chExt cx="5775959" cy="4582014"/>
+          </a:xfrm>
+        </p:grpSpPr>
+        <p:sp>
+          <p:nvSpPr>
+            <p:cNvPr id="7" name="Parallelogram 6">
+              <a:extLst>
+                <a:ext uri="{FF2B5EF4-FFF2-40B4-BE49-F238E27FC236}">
+                  <a16:creationId xmlns:a16="http://schemas.microsoft.com/office/drawing/2014/main" id="{9425748B-967B-4CF0-A43C-029B70AA1576}"/>
+                </a:ext>
+              </a:extLst>
+            </p:cNvPr>
+            <p:cNvSpPr/>
+            <p:nvPr/>
+          </p:nvSpPr>
+          <p:spPr>
+            <a:xfrm rot="171982">
+              <a:off x="8183880" y="4520041"/>
+              <a:ext cx="4892040" cy="3820014"/>
+            </a:xfrm>
+            <a:prstGeom prst="parallelogram">
+              <a:avLst>
+                <a:gd name="adj" fmla="val 111572"/>
+              </a:avLst>
+            </a:prstGeom>
+            <a:solidFill>
+              <a:srgbClr val="980404"/>
+            </a:solidFill>
+            <a:ln>
+              <a:noFill/>
+            </a:ln>
+          </p:spPr>
+          <p:style>
+            <a:lnRef idx="2">
+              <a:schemeClr val="accent1">
+                <a:shade val="50000"/>
+              </a:schemeClr>
+            </a:lnRef>
+            <a:fillRef idx="1">
+              <a:schemeClr val="accent1"/>
+            </a:fillRef>
+            <a:effectRef idx="0">
+              <a:schemeClr val="accent1"/>
+            </a:effectRef>
+            <a:fontRef idx="minor">
+              <a:schemeClr val="lt1"/>
+            </a:fontRef>
+          </p:style>
+          <p:txBody>
+            <a:bodyPr rtlCol="0" anchor="ctr"/>
+            <a:lstStyle/>
+            <a:p>
+              <a:pPr algn="ctr"/>
+              <a:endParaRPr lang="en-CA" dirty="0"/>
+            </a:p>
+          </p:txBody>
+        </p:sp>
+        <p:sp>
+          <p:nvSpPr>
+            <p:cNvPr id="8" name="Parallelogram 7">
+              <a:extLst>
+                <a:ext uri="{FF2B5EF4-FFF2-40B4-BE49-F238E27FC236}">
+                  <a16:creationId xmlns:a16="http://schemas.microsoft.com/office/drawing/2014/main" id="{7600F404-1206-4FF5-AA1C-7CB9B41BE2B8}"/>
+                </a:ext>
+              </a:extLst>
+            </p:cNvPr>
+            <p:cNvSpPr/>
+            <p:nvPr/>
+          </p:nvSpPr>
+          <p:spPr>
+            <a:xfrm rot="171982">
+              <a:off x="7741921" y="4139040"/>
+              <a:ext cx="4892040" cy="3820014"/>
+            </a:xfrm>
+            <a:prstGeom prst="parallelogram">
+              <a:avLst>
+                <a:gd name="adj" fmla="val 111572"/>
+              </a:avLst>
+            </a:prstGeom>
+            <a:solidFill>
+              <a:srgbClr val="999999"/>
+            </a:solidFill>
+            <a:ln>
+              <a:noFill/>
+            </a:ln>
+          </p:spPr>
+          <p:style>
+            <a:lnRef idx="2">
+              <a:schemeClr val="accent1">
+                <a:shade val="50000"/>
+              </a:schemeClr>
+            </a:lnRef>
+            <a:fillRef idx="1">
+              <a:schemeClr val="accent1"/>
+            </a:fillRef>
+            <a:effectRef idx="0">
+              <a:schemeClr val="accent1"/>
+            </a:effectRef>
+            <a:fontRef idx="minor">
+              <a:schemeClr val="lt1"/>
+            </a:fontRef>
+          </p:style>
+          <p:txBody>
+            <a:bodyPr rtlCol="0" anchor="ctr"/>
+            <a:lstStyle/>
+            <a:p>
+              <a:pPr algn="ctr"/>
+              <a:endParaRPr lang="en-CA" dirty="0"/>
+            </a:p>
+          </p:txBody>
+        </p:sp>
+        <p:sp>
+          <p:nvSpPr>
+            <p:cNvPr id="9" name="Parallelogram 8">
+              <a:extLst>
+                <a:ext uri="{FF2B5EF4-FFF2-40B4-BE49-F238E27FC236}">
+                  <a16:creationId xmlns:a16="http://schemas.microsoft.com/office/drawing/2014/main" id="{FCEC5D22-0168-4E54-AA07-D6310519F4A8}"/>
+                </a:ext>
+              </a:extLst>
+            </p:cNvPr>
+            <p:cNvSpPr/>
+            <p:nvPr/>
+          </p:nvSpPr>
+          <p:spPr>
+            <a:xfrm rot="171982">
+              <a:off x="7299961" y="3758041"/>
+              <a:ext cx="4892040" cy="3820014"/>
+            </a:xfrm>
+            <a:prstGeom prst="parallelogram">
+              <a:avLst>
+                <a:gd name="adj" fmla="val 111572"/>
+              </a:avLst>
+            </a:prstGeom>
+            <a:solidFill>
+              <a:srgbClr val="980404"/>
+            </a:solidFill>
+            <a:ln>
+              <a:noFill/>
+            </a:ln>
+          </p:spPr>
+          <p:style>
+            <a:lnRef idx="2">
+              <a:schemeClr val="accent1">
+                <a:shade val="50000"/>
+              </a:schemeClr>
+            </a:lnRef>
+            <a:fillRef idx="1">
+              <a:schemeClr val="accent1"/>
+            </a:fillRef>
+            <a:effectRef idx="0">
+              <a:schemeClr val="accent1"/>
+            </a:effectRef>
+            <a:fontRef idx="minor">
+              <a:schemeClr val="lt1"/>
+            </a:fontRef>
+          </p:style>
+          <p:txBody>
+            <a:bodyPr rtlCol="0" anchor="ctr"/>
+            <a:lstStyle/>
+            <a:p>
+              <a:pPr algn="ctr"/>
+              <a:endParaRPr lang="en-CA" dirty="0"/>
+            </a:p>
+          </p:txBody>
+        </p:sp>
+      </p:grpSp>
+      <p:grpSp>
+        <p:nvGrpSpPr>
+          <p:cNvPr id="14" name="Group 13">
+            <a:extLst>
+              <a:ext uri="{FF2B5EF4-FFF2-40B4-BE49-F238E27FC236}">
+                <a16:creationId xmlns:a16="http://schemas.microsoft.com/office/drawing/2014/main" id="{77AF9D72-780E-4CBD-9796-7F59FAB51D7A}"/>
+              </a:ext>
+            </a:extLst>
+          </p:cNvPr>
+          <p:cNvGrpSpPr/>
+          <p:nvPr/>
+        </p:nvGrpSpPr>
+        <p:grpSpPr>
+          <a:xfrm rot="15526026">
+            <a:off x="8455590" y="-1549322"/>
+            <a:ext cx="5775959" cy="4582014"/>
+            <a:chOff x="7299961" y="3758041"/>
+            <a:chExt cx="5775959" cy="4582014"/>
+          </a:xfrm>
+        </p:grpSpPr>
+        <p:sp>
+          <p:nvSpPr>
+            <p:cNvPr id="15" name="Parallelogram 14">
+              <a:extLst>
+                <a:ext uri="{FF2B5EF4-FFF2-40B4-BE49-F238E27FC236}">
+                  <a16:creationId xmlns:a16="http://schemas.microsoft.com/office/drawing/2014/main" id="{4080EC7E-F5B0-483E-B23A-727A953214F4}"/>
+                </a:ext>
+              </a:extLst>
+            </p:cNvPr>
+            <p:cNvSpPr/>
+            <p:nvPr/>
+          </p:nvSpPr>
+          <p:spPr>
+            <a:xfrm rot="171982">
+              <a:off x="8183880" y="4520041"/>
+              <a:ext cx="4892040" cy="3820014"/>
+            </a:xfrm>
+            <a:prstGeom prst="parallelogram">
+              <a:avLst>
+                <a:gd name="adj" fmla="val 111572"/>
+              </a:avLst>
+            </a:prstGeom>
+            <a:solidFill>
+              <a:srgbClr val="980404"/>
+            </a:solidFill>
+            <a:ln>
+              <a:noFill/>
+            </a:ln>
+          </p:spPr>
+          <p:style>
+            <a:lnRef idx="2">
+              <a:schemeClr val="accent1">
+                <a:shade val="50000"/>
+              </a:schemeClr>
+            </a:lnRef>
+            <a:fillRef idx="1">
+              <a:schemeClr val="accent1"/>
+            </a:fillRef>
+            <a:effectRef idx="0">
+              <a:schemeClr val="accent1"/>
+            </a:effectRef>
+            <a:fontRef idx="minor">
+              <a:schemeClr val="lt1"/>
+            </a:fontRef>
+          </p:style>
+          <p:txBody>
+            <a:bodyPr rtlCol="0" anchor="ctr"/>
+            <a:lstStyle/>
+            <a:p>
+              <a:pPr algn="ctr"/>
+              <a:endParaRPr lang="en-CA" dirty="0"/>
+            </a:p>
+          </p:txBody>
+        </p:sp>
+        <p:sp>
+          <p:nvSpPr>
+            <p:cNvPr id="16" name="Parallelogram 15">
+              <a:extLst>
+                <a:ext uri="{FF2B5EF4-FFF2-40B4-BE49-F238E27FC236}">
+                  <a16:creationId xmlns:a16="http://schemas.microsoft.com/office/drawing/2014/main" id="{00902860-0A1F-4491-B4C8-FAB91FA1CFF4}"/>
+                </a:ext>
+              </a:extLst>
+            </p:cNvPr>
+            <p:cNvSpPr/>
+            <p:nvPr/>
+          </p:nvSpPr>
+          <p:spPr>
+            <a:xfrm rot="171982">
+              <a:off x="7741921" y="4139040"/>
+              <a:ext cx="4892040" cy="3820014"/>
+            </a:xfrm>
+            <a:prstGeom prst="parallelogram">
+              <a:avLst>
+                <a:gd name="adj" fmla="val 111572"/>
+              </a:avLst>
+            </a:prstGeom>
+            <a:solidFill>
+              <a:srgbClr val="999999"/>
+            </a:solidFill>
+            <a:ln>
+              <a:noFill/>
+            </a:ln>
+          </p:spPr>
+          <p:style>
+            <a:lnRef idx="2">
+              <a:schemeClr val="accent1">
+                <a:shade val="50000"/>
+              </a:schemeClr>
+            </a:lnRef>
+            <a:fillRef idx="1">
+              <a:schemeClr val="accent1"/>
+            </a:fillRef>
+            <a:effectRef idx="0">
+              <a:schemeClr val="accent1"/>
+            </a:effectRef>
+            <a:fontRef idx="minor">
+              <a:schemeClr val="lt1"/>
+            </a:fontRef>
+          </p:style>
+          <p:txBody>
+            <a:bodyPr rtlCol="0" anchor="ctr"/>
+            <a:lstStyle/>
+            <a:p>
+              <a:pPr algn="ctr"/>
+              <a:endParaRPr lang="en-CA" dirty="0"/>
+            </a:p>
+          </p:txBody>
+        </p:sp>
+        <p:sp>
+          <p:nvSpPr>
+            <p:cNvPr id="17" name="Parallelogram 16">
+              <a:extLst>
+                <a:ext uri="{FF2B5EF4-FFF2-40B4-BE49-F238E27FC236}">
+                  <a16:creationId xmlns:a16="http://schemas.microsoft.com/office/drawing/2014/main" id="{1A84C5B8-5F6A-4579-8640-71A7B075D293}"/>
+                </a:ext>
+              </a:extLst>
+            </p:cNvPr>
+            <p:cNvSpPr/>
+            <p:nvPr/>
+          </p:nvSpPr>
+          <p:spPr>
+            <a:xfrm rot="171982">
+              <a:off x="7299961" y="3758041"/>
+              <a:ext cx="4892040" cy="3820014"/>
+            </a:xfrm>
+            <a:prstGeom prst="parallelogram">
+              <a:avLst>
+                <a:gd name="adj" fmla="val 111572"/>
+              </a:avLst>
+            </a:prstGeom>
+            <a:solidFill>
+              <a:srgbClr val="980404"/>
+            </a:solidFill>
+            <a:ln>
+              <a:noFill/>
+            </a:ln>
+          </p:spPr>
+          <p:style>
+            <a:lnRef idx="2">
+              <a:schemeClr val="accent1">
+                <a:shade val="50000"/>
+              </a:schemeClr>
+            </a:lnRef>
+            <a:fillRef idx="1">
+              <a:schemeClr val="accent1"/>
+            </a:fillRef>
+            <a:effectRef idx="0">
+              <a:schemeClr val="accent1"/>
+            </a:effectRef>
+            <a:fontRef idx="minor">
+              <a:schemeClr val="lt1"/>
+            </a:fontRef>
+          </p:style>
+          <p:txBody>
+            <a:bodyPr rtlCol="0" anchor="ctr"/>
+            <a:lstStyle/>
+            <a:p>
+              <a:pPr algn="ctr"/>
+              <a:endParaRPr lang="en-CA" dirty="0"/>
+            </a:p>
+          </p:txBody>
+        </p:sp>
+      </p:grpSp>
     </p:spTree>
     <p:extLst>
       <p:ext uri="{BB962C8B-B14F-4D97-AF65-F5344CB8AC3E}">

</xml_diff>